<commit_message>
Updated with References and Corrected Typos
</commit_message>
<xml_diff>
--- a/Cold Storage Case Study.pptx
+++ b/Cold Storage Case Study.pptx
@@ -12,6 +12,7 @@
     <p:sldId id="260" r:id="rId6"/>
     <p:sldId id="261" r:id="rId7"/>
     <p:sldId id="262" r:id="rId8"/>
+    <p:sldId id="263" r:id="rId9"/>
   </p:sldIdLst>
   <p:sldSz cx="12192000" cy="6858000"/>
   <p:notesSz cx="6858000" cy="9144000"/>
@@ -110,6 +111,11 @@
       </a:defRPr>
     </a:lvl9pPr>
   </p:defaultTextStyle>
+  <p:extLst>
+    <p:ext uri="{EFAFB233-063F-42B5-8137-9DF3F51BA10A}">
+      <p15:sldGuideLst xmlns:p15="http://schemas.microsoft.com/office/powerpoint/2012/main"/>
+    </p:ext>
+  </p:extLst>
 </p:presentation>
 </file>
 
@@ -13382,12 +13388,17 @@
             </a:r>
             <a:r>
               <a:rPr lang="en-US" dirty="0"/>
-              <a:t>Industry The Size of the Global Cold Storage market is - Around $80Billion , expected to reach $</a:t>
-            </a:r>
-            <a:r>
-              <a:rPr lang="en-US" dirty="0" smtClean="0"/>
-              <a:t>200Billion.</a:t>
-            </a:r>
+              <a:t>Industry The Size of the Global Cold Storage market is - Around $80Billion , expected to reach </a:t>
+            </a:r>
+            <a:r>
+              <a:rPr lang="en-US"/>
+              <a:t>$</a:t>
+            </a:r>
+            <a:r>
+              <a:rPr lang="en-US" smtClean="0"/>
+              <a:t>200Billion by 2025.</a:t>
+            </a:r>
+            <a:endParaRPr lang="en-US" dirty="0" smtClean="0"/>
           </a:p>
           <a:p>
             <a:pPr marL="0" indent="0">
@@ -13873,6 +13884,111 @@
     <p:extLst>
       <p:ext uri="{BB962C8B-B14F-4D97-AF65-F5344CB8AC3E}">
         <p14:creationId xmlns:p14="http://schemas.microsoft.com/office/powerpoint/2010/main" val="3859043896"/>
+      </p:ext>
+    </p:extLst>
+  </p:cSld>
+  <p:clrMapOvr>
+    <a:masterClrMapping/>
+  </p:clrMapOvr>
+</p:sld>
+</file>
+
+<file path=ppt/slides/slide8.xml><?xml version="1.0" encoding="utf-8"?>
+<p:sld xmlns:a="http://schemas.openxmlformats.org/drawingml/2006/main" xmlns:r="http://schemas.openxmlformats.org/officeDocument/2006/relationships" xmlns:p="http://schemas.openxmlformats.org/presentationml/2006/main">
+  <p:cSld>
+    <p:spTree>
+      <p:nvGrpSpPr>
+        <p:cNvPr id="1" name=""/>
+        <p:cNvGrpSpPr/>
+        <p:nvPr/>
+      </p:nvGrpSpPr>
+      <p:grpSpPr>
+        <a:xfrm>
+          <a:off x="0" y="0"/>
+          <a:ext cx="0" cy="0"/>
+          <a:chOff x="0" y="0"/>
+          <a:chExt cx="0" cy="0"/>
+        </a:xfrm>
+      </p:grpSpPr>
+      <p:sp>
+        <p:nvSpPr>
+          <p:cNvPr id="2" name="Title 1"/>
+          <p:cNvSpPr>
+            <a:spLocks noGrp="1"/>
+          </p:cNvSpPr>
+          <p:nvPr>
+            <p:ph type="title"/>
+          </p:nvPr>
+        </p:nvSpPr>
+        <p:spPr/>
+        <p:txBody>
+          <a:bodyPr/>
+          <a:lstStyle/>
+          <a:p>
+            <a:r>
+              <a:rPr lang="en-US" dirty="0" smtClean="0"/>
+              <a:t>References</a:t>
+            </a:r>
+            <a:endParaRPr lang="en-US" dirty="0"/>
+          </a:p>
+        </p:txBody>
+      </p:sp>
+      <p:sp>
+        <p:nvSpPr>
+          <p:cNvPr id="3" name="Content Placeholder 2"/>
+          <p:cNvSpPr>
+            <a:spLocks noGrp="1"/>
+          </p:cNvSpPr>
+          <p:nvPr>
+            <p:ph idx="1"/>
+          </p:nvPr>
+        </p:nvSpPr>
+        <p:spPr/>
+        <p:txBody>
+          <a:bodyPr/>
+          <a:lstStyle/>
+          <a:p>
+            <a:r>
+              <a:rPr lang="en-US" dirty="0">
+                <a:hlinkClick r:id="rId2"/>
+              </a:rPr>
+              <a:t>https://www.cnx-software.com/2018/03/29/a-look-at-lorawan-and-nb-iot-power-consumption</a:t>
+            </a:r>
+            <a:r>
+              <a:rPr lang="en-US" dirty="0" smtClean="0">
+                <a:hlinkClick r:id="rId2"/>
+              </a:rPr>
+              <a:t>/</a:t>
+            </a:r>
+            <a:endParaRPr lang="en-US" dirty="0" smtClean="0"/>
+          </a:p>
+          <a:p>
+            <a:r>
+              <a:rPr lang="en-US" dirty="0">
+                <a:hlinkClick r:id="rId3"/>
+              </a:rPr>
+              <a:t>https://www.zdnet.com/article/deutsche-telekom-and-vodafone-trial-nb-iot-international-roaming</a:t>
+            </a:r>
+            <a:r>
+              <a:rPr lang="en-US" dirty="0" smtClean="0">
+                <a:hlinkClick r:id="rId3"/>
+              </a:rPr>
+              <a:t>/</a:t>
+            </a:r>
+            <a:endParaRPr lang="en-US" dirty="0" smtClean="0"/>
+          </a:p>
+          <a:p>
+            <a:r>
+              <a:rPr lang="en-US" dirty="0"/>
+              <a:t>https://www.grandviewresearch.com/press-release/global-cold-storage-market</a:t>
+            </a:r>
+          </a:p>
+        </p:txBody>
+      </p:sp>
+    </p:spTree>
+    <p:extLst>
+      <p:ext uri="{BB962C8B-B14F-4D97-AF65-F5344CB8AC3E}">
+        <p14:creationId xmlns:p14="http://schemas.microsoft.com/office/powerpoint/2010/main" val="2695448885"/>
       </p:ext>
     </p:extLst>
   </p:cSld>

</xml_diff>